<commit_message>
fixed up the presentation
</commit_message>
<xml_diff>
--- a/week_03/presentation.pptx
+++ b/week_03/presentation.pptx
@@ -3261,6 +3261,46 @@
           </a:prstGeom>
         </p:spPr>
       </p:pic>
+      <p:pic>
+        <p:nvPicPr>
+          <p:cNvPr id="5" name="Picture 4"/>
+          <p:cNvPicPr>
+            <a:picLocks noChangeAspect="1"/>
+          </p:cNvPicPr>
+          <p:nvPr/>
+        </p:nvPicPr>
+        <p:blipFill>
+          <a:blip r:embed="rId3">
+            <a:extLst>
+              <a:ext uri="{28A0092B-C50C-407E-A947-70E740481C1C}">
+                <a14:useLocalDpi xmlns:a14="http://schemas.microsoft.com/office/drawing/2010/main" val="0"/>
+              </a:ext>
+            </a:extLst>
+          </a:blip>
+          <a:stretch>
+            <a:fillRect/>
+          </a:stretch>
+        </p:blipFill>
+        <p:spPr>
+          <a:xfrm>
+            <a:off x="4084890" y="1825625"/>
+            <a:ext cx="4277322" cy="3658111"/>
+          </a:xfrm>
+          <a:prstGeom prst="rect">
+            <a:avLst/>
+          </a:prstGeom>
+          <a:ln>
+            <a:noFill/>
+          </a:ln>
+          <a:effectLst>
+            <a:outerShdw blurRad="190500" algn="tl" rotWithShape="0">
+              <a:srgbClr val="000000">
+                <a:alpha val="70000"/>
+              </a:srgbClr>
+            </a:outerShdw>
+          </a:effectLst>
+        </p:spPr>
+      </p:pic>
     </p:spTree>
     <p:extLst>
       <p:ext uri="{BB962C8B-B14F-4D97-AF65-F5344CB8AC3E}">
@@ -3277,7 +3317,83 @@
   <p:timing>
     <p:tnLst>
       <p:par>
-        <p:cTn id="1" dur="indefinite" restart="never" nodeType="tmRoot"/>
+        <p:cTn id="1" dur="indefinite" restart="never" nodeType="tmRoot">
+          <p:childTnLst>
+            <p:seq concurrent="1" nextAc="seek">
+              <p:cTn id="2" dur="indefinite" nodeType="mainSeq">
+                <p:childTnLst>
+                  <p:par>
+                    <p:cTn id="3" fill="hold">
+                      <p:stCondLst>
+                        <p:cond delay="indefinite"/>
+                      </p:stCondLst>
+                      <p:childTnLst>
+                        <p:par>
+                          <p:cTn id="4" fill="hold">
+                            <p:stCondLst>
+                              <p:cond delay="0"/>
+                            </p:stCondLst>
+                            <p:childTnLst>
+                              <p:par>
+                                <p:cTn id="5" presetID="10" presetClass="entr" presetSubtype="0" fill="hold" nodeType="clickEffect">
+                                  <p:stCondLst>
+                                    <p:cond delay="0"/>
+                                  </p:stCondLst>
+                                  <p:childTnLst>
+                                    <p:set>
+                                      <p:cBhvr>
+                                        <p:cTn id="6" dur="1" fill="hold">
+                                          <p:stCondLst>
+                                            <p:cond delay="0"/>
+                                          </p:stCondLst>
+                                        </p:cTn>
+                                        <p:tgtEl>
+                                          <p:spTgt spid="5"/>
+                                        </p:tgtEl>
+                                        <p:attrNameLst>
+                                          <p:attrName>style.visibility</p:attrName>
+                                        </p:attrNameLst>
+                                      </p:cBhvr>
+                                      <p:to>
+                                        <p:strVal val="visible"/>
+                                      </p:to>
+                                    </p:set>
+                                    <p:animEffect transition="in" filter="fade">
+                                      <p:cBhvr>
+                                        <p:cTn id="7" dur="500"/>
+                                        <p:tgtEl>
+                                          <p:spTgt spid="5"/>
+                                        </p:tgtEl>
+                                      </p:cBhvr>
+                                    </p:animEffect>
+                                  </p:childTnLst>
+                                </p:cTn>
+                              </p:par>
+                            </p:childTnLst>
+                          </p:cTn>
+                        </p:par>
+                      </p:childTnLst>
+                    </p:cTn>
+                  </p:par>
+                </p:childTnLst>
+              </p:cTn>
+              <p:prevCondLst>
+                <p:cond evt="onPrev" delay="0">
+                  <p:tgtEl>
+                    <p:sldTgt/>
+                  </p:tgtEl>
+                </p:cond>
+              </p:prevCondLst>
+              <p:nextCondLst>
+                <p:cond evt="onNext" delay="0">
+                  <p:tgtEl>
+                    <p:sldTgt/>
+                  </p:tgtEl>
+                </p:cond>
+              </p:nextCondLst>
+            </p:seq>
+          </p:childTnLst>
+        </p:cTn>
       </p:par>
     </p:tnLst>
   </p:timing>
@@ -6006,11 +6122,7 @@
           <a:p>
             <a:r>
               <a:rPr lang="en-GB" dirty="0" smtClean="0"/>
-              <a:t>We made the </a:t>
-            </a:r>
-            <a:r>
-              <a:rPr lang="en-GB" dirty="0" smtClean="0"/>
-              <a:t>on-board LED blink, using these functions:</a:t>
+              <a:t>We made the on-board LED blink, using these functions:</a:t>
             </a:r>
           </a:p>
           <a:p>
@@ -6227,94 +6339,6 @@
                       </p:childTnLst>
                     </p:cTn>
                   </p:par>
-                  <p:par>
-                    <p:cTn id="11" fill="hold">
-                      <p:stCondLst>
-                        <p:cond delay="indefinite"/>
-                      </p:stCondLst>
-                      <p:childTnLst>
-                        <p:par>
-                          <p:cTn id="12" fill="hold">
-                            <p:stCondLst>
-                              <p:cond delay="0"/>
-                            </p:stCondLst>
-                            <p:childTnLst>
-                              <p:par>
-                                <p:cTn id="13" presetID="10" presetClass="exit" presetSubtype="0" fill="hold" nodeType="clickEffect">
-                                  <p:stCondLst>
-                                    <p:cond delay="0"/>
-                                  </p:stCondLst>
-                                  <p:childTnLst>
-                                    <p:animEffect transition="out" filter="fade">
-                                      <p:cBhvr>
-                                        <p:cTn id="14" dur="500"/>
-                                        <p:tgtEl>
-                                          <p:spTgt spid="7"/>
-                                        </p:tgtEl>
-                                      </p:cBhvr>
-                                    </p:animEffect>
-                                    <p:set>
-                                      <p:cBhvr>
-                                        <p:cTn id="15" dur="1" fill="hold">
-                                          <p:stCondLst>
-                                            <p:cond delay="499"/>
-                                          </p:stCondLst>
-                                        </p:cTn>
-                                        <p:tgtEl>
-                                          <p:spTgt spid="7"/>
-                                        </p:tgtEl>
-                                        <p:attrNameLst>
-                                          <p:attrName>style.visibility</p:attrName>
-                                        </p:attrNameLst>
-                                      </p:cBhvr>
-                                      <p:to>
-                                        <p:strVal val="hidden"/>
-                                      </p:to>
-                                    </p:set>
-                                  </p:childTnLst>
-                                </p:cTn>
-                              </p:par>
-                              <p:par>
-                                <p:cTn id="16" presetID="10" presetClass="exit" presetSubtype="0" fill="hold" nodeType="withEffect">
-                                  <p:stCondLst>
-                                    <p:cond delay="300"/>
-                                  </p:stCondLst>
-                                  <p:childTnLst>
-                                    <p:animEffect transition="out" filter="fade">
-                                      <p:cBhvr>
-                                        <p:cTn id="17" dur="500"/>
-                                        <p:tgtEl>
-                                          <p:spTgt spid="5"/>
-                                        </p:tgtEl>
-                                      </p:cBhvr>
-                                    </p:animEffect>
-                                    <p:set>
-                                      <p:cBhvr>
-                                        <p:cTn id="18" dur="1" fill="hold">
-                                          <p:stCondLst>
-                                            <p:cond delay="499"/>
-                                          </p:stCondLst>
-                                        </p:cTn>
-                                        <p:tgtEl>
-                                          <p:spTgt spid="5"/>
-                                        </p:tgtEl>
-                                        <p:attrNameLst>
-                                          <p:attrName>style.visibility</p:attrName>
-                                        </p:attrNameLst>
-                                      </p:cBhvr>
-                                      <p:to>
-                                        <p:strVal val="hidden"/>
-                                      </p:to>
-                                    </p:set>
-                                  </p:childTnLst>
-                                </p:cTn>
-                              </p:par>
-                            </p:childTnLst>
-                          </p:cTn>
-                        </p:par>
-                      </p:childTnLst>
-                    </p:cTn>
-                  </p:par>
                 </p:childTnLst>
               </p:cTn>
               <p:prevCondLst>
@@ -6386,7 +6410,6 @@
               <a:rPr lang="en-GB" sz="6000" u="sng" dirty="0"/>
               <a:t> Element</a:t>
             </a:r>
-            <a:endParaRPr lang="en-GB" sz="6000" u="sng" dirty="0"/>
           </a:p>
         </p:txBody>
       </p:sp>
@@ -6487,6 +6510,14 @@
 <file path=ppt/slides/slide5.xml><?xml version="1.0" encoding="utf-8"?>
 <p:sld xmlns:a="http://schemas.openxmlformats.org/drawingml/2006/main" xmlns:r="http://schemas.openxmlformats.org/officeDocument/2006/relationships" xmlns:p="http://schemas.openxmlformats.org/presentationml/2006/main">
   <p:cSld>
+    <p:bg>
+      <p:bgPr>
+        <a:solidFill>
+          <a:schemeClr val="tx1"/>
+        </a:solidFill>
+        <a:effectLst/>
+      </p:bgPr>
+    </p:bg>
     <p:spTree>
       <p:nvGrpSpPr>
         <p:cNvPr id="1" name=""/>
@@ -6501,52 +6532,6 @@
           <a:chExt cx="0" cy="0"/>
         </a:xfrm>
       </p:grpSpPr>
-      <p:sp>
-        <p:nvSpPr>
-          <p:cNvPr id="4" name="Rectangle 3"/>
-          <p:cNvSpPr/>
-          <p:nvPr/>
-        </p:nvSpPr>
-        <p:spPr>
-          <a:xfrm>
-            <a:off x="0" y="0"/>
-            <a:ext cx="9144000" cy="6858000"/>
-          </a:xfrm>
-          <a:prstGeom prst="rect">
-            <a:avLst/>
-          </a:prstGeom>
-          <a:solidFill>
-            <a:schemeClr val="tx1"/>
-          </a:solidFill>
-          <a:ln>
-            <a:noFill/>
-          </a:ln>
-        </p:spPr>
-        <p:style>
-          <a:lnRef idx="2">
-            <a:schemeClr val="accent1">
-              <a:shade val="50000"/>
-            </a:schemeClr>
-          </a:lnRef>
-          <a:fillRef idx="1">
-            <a:schemeClr val="accent1"/>
-          </a:fillRef>
-          <a:effectRef idx="0">
-            <a:schemeClr val="accent1"/>
-          </a:effectRef>
-          <a:fontRef idx="minor">
-            <a:schemeClr val="lt1"/>
-          </a:fontRef>
-        </p:style>
-        <p:txBody>
-          <a:bodyPr rtlCol="0" anchor="ctr"/>
-          <a:lstStyle/>
-          <a:p>
-            <a:pPr algn="ctr"/>
-            <a:endParaRPr lang="en-GB"/>
-          </a:p>
-        </p:txBody>
-      </p:sp>
       <p:pic>
         <p:nvPicPr>
           <p:cNvPr id="12" name="Picture 11"/>
@@ -6593,185 +6578,9 @@
   <p:timing>
     <p:tnLst>
       <p:par>
-        <p:cTn id="1" dur="indefinite" restart="never" nodeType="tmRoot">
-          <p:childTnLst>
-            <p:seq concurrent="1" nextAc="seek">
-              <p:cTn id="2" dur="indefinite" nodeType="mainSeq">
-                <p:childTnLst>
-                  <p:par>
-                    <p:cTn id="3" fill="hold">
-                      <p:stCondLst>
-                        <p:cond delay="indefinite"/>
-                      </p:stCondLst>
-                      <p:childTnLst>
-                        <p:par>
-                          <p:cTn id="4" fill="hold">
-                            <p:stCondLst>
-                              <p:cond delay="0"/>
-                            </p:stCondLst>
-                            <p:childTnLst>
-                              <p:par>
-                                <p:cTn id="5" presetID="10" presetClass="entr" presetSubtype="0" fill="hold" grpId="0" nodeType="clickEffect">
-                                  <p:stCondLst>
-                                    <p:cond delay="0"/>
-                                  </p:stCondLst>
-                                  <p:childTnLst>
-                                    <p:set>
-                                      <p:cBhvr>
-                                        <p:cTn id="6" dur="1" fill="hold">
-                                          <p:stCondLst>
-                                            <p:cond delay="0"/>
-                                          </p:stCondLst>
-                                        </p:cTn>
-                                        <p:tgtEl>
-                                          <p:spTgt spid="4"/>
-                                        </p:tgtEl>
-                                        <p:attrNameLst>
-                                          <p:attrName>style.visibility</p:attrName>
-                                        </p:attrNameLst>
-                                      </p:cBhvr>
-                                      <p:to>
-                                        <p:strVal val="visible"/>
-                                      </p:to>
-                                    </p:set>
-                                    <p:animEffect transition="in" filter="fade">
-                                      <p:cBhvr>
-                                        <p:cTn id="7" dur="500"/>
-                                        <p:tgtEl>
-                                          <p:spTgt spid="4"/>
-                                        </p:tgtEl>
-                                      </p:cBhvr>
-                                    </p:animEffect>
-                                  </p:childTnLst>
-                                </p:cTn>
-                              </p:par>
-                            </p:childTnLst>
-                          </p:cTn>
-                        </p:par>
-                        <p:par>
-                          <p:cTn id="8" fill="hold">
-                            <p:stCondLst>
-                              <p:cond delay="500"/>
-                            </p:stCondLst>
-                            <p:childTnLst>
-                              <p:par>
-                                <p:cTn id="9" presetID="10" presetClass="entr" presetSubtype="0" fill="hold" nodeType="afterEffect">
-                                  <p:stCondLst>
-                                    <p:cond delay="0"/>
-                                  </p:stCondLst>
-                                  <p:childTnLst>
-                                    <p:set>
-                                      <p:cBhvr>
-                                        <p:cTn id="10" dur="1" fill="hold">
-                                          <p:stCondLst>
-                                            <p:cond delay="0"/>
-                                          </p:stCondLst>
-                                        </p:cTn>
-                                        <p:tgtEl>
-                                          <p:spTgt spid="12"/>
-                                        </p:tgtEl>
-                                        <p:attrNameLst>
-                                          <p:attrName>style.visibility</p:attrName>
-                                        </p:attrNameLst>
-                                      </p:cBhvr>
-                                      <p:to>
-                                        <p:strVal val="visible"/>
-                                      </p:to>
-                                    </p:set>
-                                    <p:animEffect transition="in" filter="fade">
-                                      <p:cBhvr>
-                                        <p:cTn id="11" dur="500"/>
-                                        <p:tgtEl>
-                                          <p:spTgt spid="12"/>
-                                        </p:tgtEl>
-                                      </p:cBhvr>
-                                    </p:animEffect>
-                                  </p:childTnLst>
-                                </p:cTn>
-                              </p:par>
-                            </p:childTnLst>
-                          </p:cTn>
-                        </p:par>
-                      </p:childTnLst>
-                    </p:cTn>
-                  </p:par>
-                  <p:par>
-                    <p:cTn id="12" fill="hold">
-                      <p:stCondLst>
-                        <p:cond delay="indefinite"/>
-                      </p:stCondLst>
-                      <p:childTnLst>
-                        <p:par>
-                          <p:cTn id="13" fill="hold">
-                            <p:stCondLst>
-                              <p:cond delay="0"/>
-                            </p:stCondLst>
-                            <p:childTnLst>
-                              <p:par>
-                                <p:cTn id="14" presetID="10" presetClass="exit" presetSubtype="0" fill="hold" nodeType="clickEffect">
-                                  <p:stCondLst>
-                                    <p:cond delay="0"/>
-                                  </p:stCondLst>
-                                  <p:childTnLst>
-                                    <p:animEffect transition="out" filter="fade">
-                                      <p:cBhvr>
-                                        <p:cTn id="15" dur="500"/>
-                                        <p:tgtEl>
-                                          <p:spTgt spid="12"/>
-                                        </p:tgtEl>
-                                      </p:cBhvr>
-                                    </p:animEffect>
-                                    <p:set>
-                                      <p:cBhvr>
-                                        <p:cTn id="16" dur="1" fill="hold">
-                                          <p:stCondLst>
-                                            <p:cond delay="499"/>
-                                          </p:stCondLst>
-                                        </p:cTn>
-                                        <p:tgtEl>
-                                          <p:spTgt spid="12"/>
-                                        </p:tgtEl>
-                                        <p:attrNameLst>
-                                          <p:attrName>style.visibility</p:attrName>
-                                        </p:attrNameLst>
-                                      </p:cBhvr>
-                                      <p:to>
-                                        <p:strVal val="hidden"/>
-                                      </p:to>
-                                    </p:set>
-                                  </p:childTnLst>
-                                </p:cTn>
-                              </p:par>
-                            </p:childTnLst>
-                          </p:cTn>
-                        </p:par>
-                      </p:childTnLst>
-                    </p:cTn>
-                  </p:par>
-                </p:childTnLst>
-              </p:cTn>
-              <p:prevCondLst>
-                <p:cond evt="onPrev" delay="0">
-                  <p:tgtEl>
-                    <p:sldTgt/>
-                  </p:tgtEl>
-                </p:cond>
-              </p:prevCondLst>
-              <p:nextCondLst>
-                <p:cond evt="onNext" delay="0">
-                  <p:tgtEl>
-                    <p:sldTgt/>
-                  </p:tgtEl>
-                </p:cond>
-              </p:nextCondLst>
-            </p:seq>
-          </p:childTnLst>
-        </p:cTn>
+        <p:cTn id="1" dur="indefinite" restart="never" nodeType="tmRoot"/>
       </p:par>
     </p:tnLst>
-    <p:bldLst>
-      <p:bldP spid="4" grpId="0" animBg="1"/>
-    </p:bldLst>
   </p:timing>
 </p:sld>
 </file>
@@ -6867,7 +6676,6 @@
               <a:rPr lang="en-GB" dirty="0" smtClean="0"/>
               <a:t>Using delay(1);</a:t>
             </a:r>
-            <a:endParaRPr lang="en-GB" dirty="0" smtClean="0"/>
           </a:p>
           <a:p>
             <a:r>
@@ -6916,7 +6724,6 @@
               <a:rPr lang="en-GB" dirty="0" smtClean="0"/>
               <a:t> 500Hz</a:t>
             </a:r>
-            <a:endParaRPr lang="en-GB" dirty="0" smtClean="0"/>
           </a:p>
           <a:p>
             <a:endParaRPr lang="en-GB" dirty="0"/>
@@ -8664,7 +8471,6 @@
               <a:rPr lang="en-GB" dirty="0" smtClean="0"/>
               <a:t>(250);</a:t>
             </a:r>
-            <a:endParaRPr lang="en-GB" dirty="0" smtClean="0"/>
           </a:p>
           <a:p>
             <a:r>
@@ -8743,13 +8549,7 @@
               <a:rPr lang="en-GB" dirty="0" smtClean="0">
                 <a:sym typeface="Wingdings" panose="05000000000000000000" pitchFamily="2" charset="2"/>
               </a:rPr>
-              <a:t>   </a:t>
-            </a:r>
-            <a:r>
-              <a:rPr lang="en-GB" dirty="0" smtClean="0">
-                <a:sym typeface="Wingdings" panose="05000000000000000000" pitchFamily="2" charset="2"/>
-              </a:rPr>
-              <a:t>   1 / 0.0005 </a:t>
+              <a:t>      1 / 0.0005 </a:t>
             </a:r>
             <a:r>
               <a:rPr lang="en-GB" sz="2400" dirty="0" smtClean="0">
@@ -9278,7 +9078,6 @@
               <a:rPr lang="en-GB" dirty="0" smtClean="0"/>
               <a:t>);</a:t>
             </a:r>
-            <a:endParaRPr lang="en-GB" dirty="0" smtClean="0"/>
           </a:p>
           <a:p>
             <a:pPr lvl="1"/>
@@ -9310,7 +9109,6 @@
               <a:rPr lang="en-GB" dirty="0" smtClean="0"/>
               <a:t>);</a:t>
             </a:r>
-            <a:endParaRPr lang="en-GB" dirty="0" smtClean="0"/>
           </a:p>
           <a:p>
             <a:r>
@@ -9577,6 +9375,50 @@
                             </p:childTnLst>
                           </p:cTn>
                         </p:par>
+                        <p:par>
+                          <p:cTn id="19" fill="hold">
+                            <p:stCondLst>
+                              <p:cond delay="500"/>
+                            </p:stCondLst>
+                            <p:childTnLst>
+                              <p:par>
+                                <p:cTn id="20" presetID="10" presetClass="entr" presetSubtype="0" fill="hold" nodeType="afterEffect">
+                                  <p:stCondLst>
+                                    <p:cond delay="0"/>
+                                  </p:stCondLst>
+                                  <p:childTnLst>
+                                    <p:set>
+                                      <p:cBhvr>
+                                        <p:cTn id="21" dur="1" fill="hold">
+                                          <p:stCondLst>
+                                            <p:cond delay="0"/>
+                                          </p:stCondLst>
+                                        </p:cTn>
+                                        <p:tgtEl>
+                                          <p:spTgt spid="4"/>
+                                        </p:tgtEl>
+                                        <p:attrNameLst>
+                                          <p:attrName>style.visibility</p:attrName>
+                                        </p:attrNameLst>
+                                      </p:cBhvr>
+                                      <p:to>
+                                        <p:strVal val="visible"/>
+                                      </p:to>
+                                    </p:set>
+                                    <p:animEffect transition="in" filter="fade">
+                                      <p:cBhvr>
+                                        <p:cTn id="22" dur="500"/>
+                                        <p:tgtEl>
+                                          <p:spTgt spid="4"/>
+                                        </p:tgtEl>
+                                      </p:cBhvr>
+                                    </p:animEffect>
+                                  </p:childTnLst>
+                                </p:cTn>
+                              </p:par>
+                            </p:childTnLst>
+                          </p:cTn>
+                        </p:par>
                       </p:childTnLst>
                     </p:cTn>
                   </p:par>
@@ -9602,7 +9444,7 @@
       </p:par>
     </p:tnLst>
     <p:bldLst>
-      <p:bldP spid="3" grpId="0" build="p"/>
+      <p:bldP spid="3" grpId="0" uiExpand="1" build="p"/>
     </p:bldLst>
   </p:timing>
 </p:sld>

</xml_diff>